<commit_message>
Lesson 2 slides: minor typo fix; updated PDF to reflect changes in PPTX.
</commit_message>
<xml_diff>
--- a/slides/Lesson 2/Hear Me Code - Lists and Loops.pptx
+++ b/slides/Lesson 2/Hear Me Code - Lists and Loops.pptx
@@ -145,6 +145,11 @@
       </a:defRPr>
     </a:lvl9pPr>
   </p:defaultTextStyle>
+  <p:extLst>
+    <p:ext uri="{EFAFB233-063F-42B5-8137-9DF3F51BA10A}">
+      <p15:sldGuideLst xmlns:p15="http://schemas.microsoft.com/office/powerpoint/2012/main"/>
+    </p:ext>
+  </p:extLst>
 </p:presentation>
 </file>
 
@@ -2232,7 +2237,7 @@
           </a:ln>
           <a:extLst>
             <a:ext uri="{C572A759-6A51-4108-AA02-DFA0A04FC94B}">
-              <ma14:wrappingTextBoxFlag xmlns:ma14="http://schemas.microsoft.com/office/mac/drawingml/2011/main" xmlns="" val="1"/>
+              <ma14:wrappingTextBoxFlag xmlns="" xmlns:ma14="http://schemas.microsoft.com/office/mac/drawingml/2011/main" val="1"/>
             </a:ext>
           </a:extLst>
         </p:spPr>
@@ -2595,7 +2600,7 @@
             <a:effectLst/>
             <a:extLst>
               <a:ext uri="{C572A759-6A51-4108-AA02-DFA0A04FC94B}">
-                <ma14:wrappingTextBoxFlag xmlns:ma14="http://schemas.microsoft.com/office/mac/drawingml/2011/main" xmlns="" val="1"/>
+                <ma14:wrappingTextBoxFlag xmlns="" xmlns:ma14="http://schemas.microsoft.com/office/mac/drawingml/2011/main" val="1"/>
               </a:ext>
             </a:extLst>
           </p:spPr>
@@ -2735,7 +2740,7 @@
           </a:ln>
           <a:extLst>
             <a:ext uri="{C572A759-6A51-4108-AA02-DFA0A04FC94B}">
-              <ma14:wrappingTextBoxFlag xmlns:ma14="http://schemas.microsoft.com/office/mac/drawingml/2011/main" xmlns="" val="1"/>
+              <ma14:wrappingTextBoxFlag xmlns="" xmlns:ma14="http://schemas.microsoft.com/office/mac/drawingml/2011/main" val="1"/>
             </a:ext>
           </a:extLst>
         </p:spPr>
@@ -3100,7 +3105,7 @@
             <a:effectLst/>
             <a:extLst>
               <a:ext uri="{C572A759-6A51-4108-AA02-DFA0A04FC94B}">
-                <ma14:wrappingTextBoxFlag xmlns:ma14="http://schemas.microsoft.com/office/mac/drawingml/2011/main" xmlns="" val="1"/>
+                <ma14:wrappingTextBoxFlag xmlns="" xmlns:ma14="http://schemas.microsoft.com/office/mac/drawingml/2011/main" val="1"/>
               </a:ext>
             </a:extLst>
           </p:spPr>
@@ -3477,7 +3482,7 @@
           </a:ln>
           <a:extLst>
             <a:ext uri="{C572A759-6A51-4108-AA02-DFA0A04FC94B}">
-              <ma14:wrappingTextBoxFlag xmlns:ma14="http://schemas.microsoft.com/office/mac/drawingml/2011/main" xmlns="" val="1"/>
+              <ma14:wrappingTextBoxFlag xmlns="" xmlns:ma14="http://schemas.microsoft.com/office/mac/drawingml/2011/main" val="1"/>
             </a:ext>
           </a:extLst>
         </p:spPr>
@@ -3559,7 +3564,7 @@
           </a:ln>
           <a:extLst>
             <a:ext uri="{C572A759-6A51-4108-AA02-DFA0A04FC94B}">
-              <ma14:wrappingTextBoxFlag xmlns:ma14="http://schemas.microsoft.com/office/mac/drawingml/2011/main" xmlns="" val="1"/>
+              <ma14:wrappingTextBoxFlag xmlns="" xmlns:ma14="http://schemas.microsoft.com/office/mac/drawingml/2011/main" val="1"/>
             </a:ext>
           </a:extLst>
         </p:spPr>
@@ -3606,7 +3611,7 @@
           </a:ln>
           <a:extLst>
             <a:ext uri="{C572A759-6A51-4108-AA02-DFA0A04FC94B}">
-              <ma14:wrappingTextBoxFlag xmlns:ma14="http://schemas.microsoft.com/office/mac/drawingml/2011/main" xmlns="" val="1"/>
+              <ma14:wrappingTextBoxFlag xmlns="" xmlns:ma14="http://schemas.microsoft.com/office/mac/drawingml/2011/main" val="1"/>
             </a:ext>
           </a:extLst>
         </p:spPr>
@@ -4633,7 +4638,7 @@
           </a:ln>
           <a:extLst>
             <a:ext uri="{C572A759-6A51-4108-AA02-DFA0A04FC94B}">
-              <ma14:wrappingTextBoxFlag xmlns:ma14="http://schemas.microsoft.com/office/mac/drawingml/2011/main" xmlns="" val="1"/>
+              <ma14:wrappingTextBoxFlag xmlns="" xmlns:ma14="http://schemas.microsoft.com/office/mac/drawingml/2011/main" val="1"/>
             </a:ext>
           </a:extLst>
         </p:spPr>
@@ -4914,7 +4919,7 @@
           </a:ln>
           <a:extLst>
             <a:ext uri="{C572A759-6A51-4108-AA02-DFA0A04FC94B}">
-              <ma14:wrappingTextBoxFlag xmlns:ma14="http://schemas.microsoft.com/office/mac/drawingml/2011/main" xmlns="" val="1"/>
+              <ma14:wrappingTextBoxFlag xmlns="" xmlns:ma14="http://schemas.microsoft.com/office/mac/drawingml/2011/main" val="1"/>
             </a:ext>
           </a:extLst>
         </p:spPr>
@@ -5259,7 +5264,7 @@
           </a:ln>
           <a:extLst>
             <a:ext uri="{C572A759-6A51-4108-AA02-DFA0A04FC94B}">
-              <ma14:wrappingTextBoxFlag xmlns:ma14="http://schemas.microsoft.com/office/mac/drawingml/2011/main" xmlns="" val="1"/>
+              <ma14:wrappingTextBoxFlag xmlns="" xmlns:ma14="http://schemas.microsoft.com/office/mac/drawingml/2011/main" val="1"/>
             </a:ext>
           </a:extLst>
         </p:spPr>
@@ -5495,7 +5500,7 @@
           </a:ln>
           <a:extLst>
             <a:ext uri="{C572A759-6A51-4108-AA02-DFA0A04FC94B}">
-              <ma14:wrappingTextBoxFlag xmlns:ma14="http://schemas.microsoft.com/office/mac/drawingml/2011/main" xmlns="" val="1"/>
+              <ma14:wrappingTextBoxFlag xmlns="" xmlns:ma14="http://schemas.microsoft.com/office/mac/drawingml/2011/main" val="1"/>
             </a:ext>
           </a:extLst>
         </p:spPr>
@@ -5801,7 +5806,7 @@
           </a:ln>
           <a:extLst>
             <a:ext uri="{C572A759-6A51-4108-AA02-DFA0A04FC94B}">
-              <ma14:wrappingTextBoxFlag xmlns:ma14="http://schemas.microsoft.com/office/mac/drawingml/2011/main" xmlns="" val="1"/>
+              <ma14:wrappingTextBoxFlag xmlns="" xmlns:ma14="http://schemas.microsoft.com/office/mac/drawingml/2011/main" val="1"/>
             </a:ext>
           </a:extLst>
         </p:spPr>
@@ -6137,7 +6142,7 @@
           </a:ln>
           <a:extLst>
             <a:ext uri="{C572A759-6A51-4108-AA02-DFA0A04FC94B}">
-              <ma14:wrappingTextBoxFlag xmlns:ma14="http://schemas.microsoft.com/office/mac/drawingml/2011/main" xmlns="" val="1"/>
+              <ma14:wrappingTextBoxFlag xmlns="" xmlns:ma14="http://schemas.microsoft.com/office/mac/drawingml/2011/main" val="1"/>
             </a:ext>
           </a:extLst>
         </p:spPr>
@@ -6489,7 +6494,7 @@
           </a:ln>
           <a:extLst>
             <a:ext uri="{C572A759-6A51-4108-AA02-DFA0A04FC94B}">
-              <ma14:wrappingTextBoxFlag xmlns:ma14="http://schemas.microsoft.com/office/mac/drawingml/2011/main" xmlns="" val="1"/>
+              <ma14:wrappingTextBoxFlag xmlns="" xmlns:ma14="http://schemas.microsoft.com/office/mac/drawingml/2011/main" val="1"/>
             </a:ext>
           </a:extLst>
         </p:spPr>
@@ -6746,7 +6751,7 @@
           </a:ln>
           <a:extLst>
             <a:ext uri="{C572A759-6A51-4108-AA02-DFA0A04FC94B}">
-              <ma14:wrappingTextBoxFlag xmlns:ma14="http://schemas.microsoft.com/office/mac/drawingml/2011/main" xmlns="" val="1"/>
+              <ma14:wrappingTextBoxFlag xmlns="" xmlns:ma14="http://schemas.microsoft.com/office/mac/drawingml/2011/main" val="1"/>
             </a:ext>
           </a:extLst>
         </p:spPr>
@@ -7040,7 +7045,7 @@
           </a:ln>
           <a:extLst>
             <a:ext uri="{C572A759-6A51-4108-AA02-DFA0A04FC94B}">
-              <ma14:wrappingTextBoxFlag xmlns:ma14="http://schemas.microsoft.com/office/mac/drawingml/2011/main" xmlns="" val="1"/>
+              <ma14:wrappingTextBoxFlag xmlns="" xmlns:ma14="http://schemas.microsoft.com/office/mac/drawingml/2011/main" val="1"/>
             </a:ext>
           </a:extLst>
         </p:spPr>
@@ -7405,7 +7410,7 @@
           </a:ln>
           <a:extLst>
             <a:ext uri="{C572A759-6A51-4108-AA02-DFA0A04FC94B}">
-              <ma14:wrappingTextBoxFlag xmlns:ma14="http://schemas.microsoft.com/office/mac/drawingml/2011/main" xmlns="" val="1"/>
+              <ma14:wrappingTextBoxFlag xmlns="" xmlns:ma14="http://schemas.microsoft.com/office/mac/drawingml/2011/main" val="1"/>
             </a:ext>
           </a:extLst>
         </p:spPr>
@@ -7863,6 +7868,18 @@
               </a:rPr>
               <a:t>address</a:t>
             </a:r>
+            <a:r>
+              <a:rPr lang="en-US" sz="2600" dirty="0" smtClean="0">
+                <a:uFill>
+                  <a:solidFill/>
+                </a:uFill>
+                <a:latin typeface="+mn-lt"/>
+                <a:ea typeface="+mn-ea"/>
+                <a:cs typeface="+mn-cs"/>
+                <a:sym typeface="Century Gothic"/>
+              </a:rPr>
+              <a:t>.</a:t>
+            </a:r>
             <a:endParaRPr sz="2600" dirty="0">
               <a:uFill>
                 <a:solidFill/>
@@ -7973,7 +7990,7 @@
           </a:ln>
           <a:extLst>
             <a:ext uri="{C572A759-6A51-4108-AA02-DFA0A04FC94B}">
-              <ma14:wrappingTextBoxFlag xmlns:ma14="http://schemas.microsoft.com/office/mac/drawingml/2011/main" xmlns="" val="1"/>
+              <ma14:wrappingTextBoxFlag xmlns="" xmlns:ma14="http://schemas.microsoft.com/office/mac/drawingml/2011/main" val="1"/>
             </a:ext>
           </a:extLst>
         </p:spPr>
@@ -8277,7 +8294,7 @@
           </a:ln>
           <a:extLst>
             <a:ext uri="{C572A759-6A51-4108-AA02-DFA0A04FC94B}">
-              <ma14:wrappingTextBoxFlag xmlns:ma14="http://schemas.microsoft.com/office/mac/drawingml/2011/main" xmlns="" val="1"/>
+              <ma14:wrappingTextBoxFlag xmlns="" xmlns:ma14="http://schemas.microsoft.com/office/mac/drawingml/2011/main" val="1"/>
             </a:ext>
           </a:extLst>
         </p:spPr>
@@ -8513,7 +8530,7 @@
           </a:ln>
           <a:extLst>
             <a:ext uri="{C572A759-6A51-4108-AA02-DFA0A04FC94B}">
-              <ma14:wrappingTextBoxFlag xmlns:ma14="http://schemas.microsoft.com/office/mac/drawingml/2011/main" xmlns="" val="1"/>
+              <ma14:wrappingTextBoxFlag xmlns="" xmlns:ma14="http://schemas.microsoft.com/office/mac/drawingml/2011/main" val="1"/>
             </a:ext>
           </a:extLst>
         </p:spPr>
@@ -8774,7 +8791,7 @@
           </a:ln>
           <a:extLst>
             <a:ext uri="{C572A759-6A51-4108-AA02-DFA0A04FC94B}">
-              <ma14:wrappingTextBoxFlag xmlns:ma14="http://schemas.microsoft.com/office/mac/drawingml/2011/main" xmlns="" val="1"/>
+              <ma14:wrappingTextBoxFlag xmlns="" xmlns:ma14="http://schemas.microsoft.com/office/mac/drawingml/2011/main" val="1"/>
             </a:ext>
           </a:extLst>
         </p:spPr>
@@ -9051,7 +9068,7 @@
           </a:ln>
           <a:extLst>
             <a:ext uri="{C572A759-6A51-4108-AA02-DFA0A04FC94B}">
-              <ma14:wrappingTextBoxFlag xmlns:ma14="http://schemas.microsoft.com/office/mac/drawingml/2011/main" xmlns="" val="1"/>
+              <ma14:wrappingTextBoxFlag xmlns="" xmlns:ma14="http://schemas.microsoft.com/office/mac/drawingml/2011/main" val="1"/>
             </a:ext>
           </a:extLst>
         </p:spPr>
@@ -9352,7 +9369,7 @@
           </a:ln>
           <a:extLst>
             <a:ext uri="{C572A759-6A51-4108-AA02-DFA0A04FC94B}">
-              <ma14:wrappingTextBoxFlag xmlns:ma14="http://schemas.microsoft.com/office/mac/drawingml/2011/main" xmlns="" val="1"/>
+              <ma14:wrappingTextBoxFlag xmlns="" xmlns:ma14="http://schemas.microsoft.com/office/mac/drawingml/2011/main" val="1"/>
             </a:ext>
           </a:extLst>
         </p:spPr>
@@ -9606,7 +9623,7 @@
           </a:ln>
           <a:extLst>
             <a:ext uri="{C572A759-6A51-4108-AA02-DFA0A04FC94B}">
-              <ma14:wrappingTextBoxFlag xmlns:ma14="http://schemas.microsoft.com/office/mac/drawingml/2011/main" xmlns="" val="1"/>
+              <ma14:wrappingTextBoxFlag xmlns="" xmlns:ma14="http://schemas.microsoft.com/office/mac/drawingml/2011/main" val="1"/>
             </a:ext>
           </a:extLst>
         </p:spPr>
@@ -9932,7 +9949,7 @@
           </a:ln>
           <a:extLst>
             <a:ext uri="{C572A759-6A51-4108-AA02-DFA0A04FC94B}">
-              <ma14:wrappingTextBoxFlag xmlns:ma14="http://schemas.microsoft.com/office/mac/drawingml/2011/main" xmlns="" val="1"/>
+              <ma14:wrappingTextBoxFlag xmlns="" xmlns:ma14="http://schemas.microsoft.com/office/mac/drawingml/2011/main" val="1"/>
             </a:ext>
           </a:extLst>
         </p:spPr>
@@ -10206,7 +10223,7 @@
           </a:ln>
           <a:extLst>
             <a:ext uri="{C572A759-6A51-4108-AA02-DFA0A04FC94B}">
-              <ma14:wrappingTextBoxFlag xmlns:ma14="http://schemas.microsoft.com/office/mac/drawingml/2011/main" xmlns="" val="1"/>
+              <ma14:wrappingTextBoxFlag xmlns="" xmlns:ma14="http://schemas.microsoft.com/office/mac/drawingml/2011/main" val="1"/>
             </a:ext>
           </a:extLst>
         </p:spPr>
@@ -10433,7 +10450,7 @@
           </a:ln>
           <a:extLst>
             <a:ext uri="{C572A759-6A51-4108-AA02-DFA0A04FC94B}">
-              <ma14:wrappingTextBoxFlag xmlns:ma14="http://schemas.microsoft.com/office/mac/drawingml/2011/main" xmlns="" val="1"/>
+              <ma14:wrappingTextBoxFlag xmlns="" xmlns:ma14="http://schemas.microsoft.com/office/mac/drawingml/2011/main" val="1"/>
             </a:ext>
           </a:extLst>
         </p:spPr>
@@ -10917,7 +10934,7 @@
           </a:ln>
           <a:extLst>
             <a:ext uri="{C572A759-6A51-4108-AA02-DFA0A04FC94B}">
-              <ma14:wrappingTextBoxFlag xmlns:ma14="http://schemas.microsoft.com/office/mac/drawingml/2011/main" xmlns="" val="1"/>
+              <ma14:wrappingTextBoxFlag xmlns="" xmlns:ma14="http://schemas.microsoft.com/office/mac/drawingml/2011/main" val="1"/>
             </a:ext>
           </a:extLst>
         </p:spPr>
@@ -11209,7 +11226,7 @@
           </a:ln>
           <a:extLst>
             <a:ext uri="{C572A759-6A51-4108-AA02-DFA0A04FC94B}">
-              <ma14:wrappingTextBoxFlag xmlns:ma14="http://schemas.microsoft.com/office/mac/drawingml/2011/main" xmlns="" val="1"/>
+              <ma14:wrappingTextBoxFlag xmlns="" xmlns:ma14="http://schemas.microsoft.com/office/mac/drawingml/2011/main" val="1"/>
             </a:ext>
           </a:extLst>
         </p:spPr>
@@ -11761,7 +11778,7 @@
           </a:ln>
           <a:extLst>
             <a:ext uri="{C572A759-6A51-4108-AA02-DFA0A04FC94B}">
-              <ma14:wrappingTextBoxFlag xmlns:ma14="http://schemas.microsoft.com/office/mac/drawingml/2011/main" xmlns="" val="1"/>
+              <ma14:wrappingTextBoxFlag xmlns="" xmlns:ma14="http://schemas.microsoft.com/office/mac/drawingml/2011/main" val="1"/>
             </a:ext>
           </a:extLst>
         </p:spPr>
@@ -12201,7 +12218,7 @@
           </a:ln>
           <a:extLst>
             <a:ext uri="{C572A759-6A51-4108-AA02-DFA0A04FC94B}">
-              <ma14:wrappingTextBoxFlag xmlns:ma14="http://schemas.microsoft.com/office/mac/drawingml/2011/main" xmlns="" val="1"/>
+              <ma14:wrappingTextBoxFlag xmlns="" xmlns:ma14="http://schemas.microsoft.com/office/mac/drawingml/2011/main" val="1"/>
             </a:ext>
           </a:extLst>
         </p:spPr>
@@ -12374,7 +12391,7 @@
           </a:ln>
           <a:extLst>
             <a:ext uri="{C572A759-6A51-4108-AA02-DFA0A04FC94B}">
-              <ma14:wrappingTextBoxFlag xmlns:ma14="http://schemas.microsoft.com/office/mac/drawingml/2011/main" xmlns="" val="1"/>
+              <ma14:wrappingTextBoxFlag xmlns="" xmlns:ma14="http://schemas.microsoft.com/office/mac/drawingml/2011/main" val="1"/>
             </a:ext>
           </a:extLst>
         </p:spPr>
@@ -12575,7 +12592,7 @@
           </a:ln>
           <a:extLst>
             <a:ext uri="{C572A759-6A51-4108-AA02-DFA0A04FC94B}">
-              <ma14:wrappingTextBoxFlag xmlns:ma14="http://schemas.microsoft.com/office/mac/drawingml/2011/main" xmlns="" val="1"/>
+              <ma14:wrappingTextBoxFlag xmlns="" xmlns:ma14="http://schemas.microsoft.com/office/mac/drawingml/2011/main" val="1"/>
             </a:ext>
           </a:extLst>
         </p:spPr>
@@ -12838,7 +12855,7 @@
           </a:ln>
           <a:extLst>
             <a:ext uri="{C572A759-6A51-4108-AA02-DFA0A04FC94B}">
-              <ma14:wrappingTextBoxFlag xmlns:ma14="http://schemas.microsoft.com/office/mac/drawingml/2011/main" xmlns="" val="1"/>
+              <ma14:wrappingTextBoxFlag xmlns="" xmlns:ma14="http://schemas.microsoft.com/office/mac/drawingml/2011/main" val="1"/>
             </a:ext>
           </a:extLst>
         </p:spPr>
@@ -13035,7 +13052,7 @@
           </a:ln>
           <a:extLst>
             <a:ext uri="{C572A759-6A51-4108-AA02-DFA0A04FC94B}">
-              <ma14:wrappingTextBoxFlag xmlns:ma14="http://schemas.microsoft.com/office/mac/drawingml/2011/main" xmlns="" val="1"/>
+              <ma14:wrappingTextBoxFlag xmlns="" xmlns:ma14="http://schemas.microsoft.com/office/mac/drawingml/2011/main" val="1"/>
             </a:ext>
           </a:extLst>
         </p:spPr>
@@ -13254,7 +13271,7 @@
           </a:ln>
           <a:extLst>
             <a:ext uri="{C572A759-6A51-4108-AA02-DFA0A04FC94B}">
-              <ma14:wrappingTextBoxFlag xmlns:ma14="http://schemas.microsoft.com/office/mac/drawingml/2011/main" xmlns="" val="1"/>
+              <ma14:wrappingTextBoxFlag xmlns="" xmlns:ma14="http://schemas.microsoft.com/office/mac/drawingml/2011/main" val="1"/>
             </a:ext>
           </a:extLst>
         </p:spPr>
@@ -13561,7 +13578,7 @@
           </a:ln>
           <a:extLst>
             <a:ext uri="{C572A759-6A51-4108-AA02-DFA0A04FC94B}">
-              <ma14:wrappingTextBoxFlag xmlns:ma14="http://schemas.microsoft.com/office/mac/drawingml/2011/main" xmlns="" val="1"/>
+              <ma14:wrappingTextBoxFlag xmlns="" xmlns:ma14="http://schemas.microsoft.com/office/mac/drawingml/2011/main" val="1"/>
             </a:ext>
           </a:extLst>
         </p:spPr>

</xml_diff>

<commit_message>
lesson 2 slides -- fixed typo on slide 5 (lowercase > lower)
</commit_message>
<xml_diff>
--- a/slides/Lesson 2/Hear Me Code - Lists and Loops.pptx
+++ b/slides/Lesson 2/Hear Me Code - Lists and Loops.pptx
@@ -2237,7 +2237,7 @@
           </a:ln>
           <a:extLst>
             <a:ext uri="{C572A759-6A51-4108-AA02-DFA0A04FC94B}">
-              <ma14:wrappingTextBoxFlag xmlns="" xmlns:ma14="http://schemas.microsoft.com/office/mac/drawingml/2011/main" val="1"/>
+              <ma14:wrappingTextBoxFlag xmlns:ma14="http://schemas.microsoft.com/office/mac/drawingml/2011/main" xmlns="" val="1"/>
             </a:ext>
           </a:extLst>
         </p:spPr>
@@ -2600,7 +2600,7 @@
             <a:effectLst/>
             <a:extLst>
               <a:ext uri="{C572A759-6A51-4108-AA02-DFA0A04FC94B}">
-                <ma14:wrappingTextBoxFlag xmlns="" xmlns:ma14="http://schemas.microsoft.com/office/mac/drawingml/2011/main" val="1"/>
+                <ma14:wrappingTextBoxFlag xmlns:ma14="http://schemas.microsoft.com/office/mac/drawingml/2011/main" xmlns="" val="1"/>
               </a:ext>
             </a:extLst>
           </p:spPr>
@@ -2740,7 +2740,7 @@
           </a:ln>
           <a:extLst>
             <a:ext uri="{C572A759-6A51-4108-AA02-DFA0A04FC94B}">
-              <ma14:wrappingTextBoxFlag xmlns="" xmlns:ma14="http://schemas.microsoft.com/office/mac/drawingml/2011/main" val="1"/>
+              <ma14:wrappingTextBoxFlag xmlns:ma14="http://schemas.microsoft.com/office/mac/drawingml/2011/main" xmlns="" val="1"/>
             </a:ext>
           </a:extLst>
         </p:spPr>
@@ -3105,7 +3105,7 @@
             <a:effectLst/>
             <a:extLst>
               <a:ext uri="{C572A759-6A51-4108-AA02-DFA0A04FC94B}">
-                <ma14:wrappingTextBoxFlag xmlns="" xmlns:ma14="http://schemas.microsoft.com/office/mac/drawingml/2011/main" val="1"/>
+                <ma14:wrappingTextBoxFlag xmlns:ma14="http://schemas.microsoft.com/office/mac/drawingml/2011/main" xmlns="" val="1"/>
               </a:ext>
             </a:extLst>
           </p:spPr>
@@ -3482,7 +3482,7 @@
           </a:ln>
           <a:extLst>
             <a:ext uri="{C572A759-6A51-4108-AA02-DFA0A04FC94B}">
-              <ma14:wrappingTextBoxFlag xmlns="" xmlns:ma14="http://schemas.microsoft.com/office/mac/drawingml/2011/main" val="1"/>
+              <ma14:wrappingTextBoxFlag xmlns:ma14="http://schemas.microsoft.com/office/mac/drawingml/2011/main" xmlns="" val="1"/>
             </a:ext>
           </a:extLst>
         </p:spPr>
@@ -3564,7 +3564,7 @@
           </a:ln>
           <a:extLst>
             <a:ext uri="{C572A759-6A51-4108-AA02-DFA0A04FC94B}">
-              <ma14:wrappingTextBoxFlag xmlns="" xmlns:ma14="http://schemas.microsoft.com/office/mac/drawingml/2011/main" val="1"/>
+              <ma14:wrappingTextBoxFlag xmlns:ma14="http://schemas.microsoft.com/office/mac/drawingml/2011/main" xmlns="" val="1"/>
             </a:ext>
           </a:extLst>
         </p:spPr>
@@ -3611,7 +3611,7 @@
           </a:ln>
           <a:extLst>
             <a:ext uri="{C572A759-6A51-4108-AA02-DFA0A04FC94B}">
-              <ma14:wrappingTextBoxFlag xmlns="" xmlns:ma14="http://schemas.microsoft.com/office/mac/drawingml/2011/main" val="1"/>
+              <ma14:wrappingTextBoxFlag xmlns:ma14="http://schemas.microsoft.com/office/mac/drawingml/2011/main" xmlns="" val="1"/>
             </a:ext>
           </a:extLst>
         </p:spPr>
@@ -4638,7 +4638,7 @@
           </a:ln>
           <a:extLst>
             <a:ext uri="{C572A759-6A51-4108-AA02-DFA0A04FC94B}">
-              <ma14:wrappingTextBoxFlag xmlns="" xmlns:ma14="http://schemas.microsoft.com/office/mac/drawingml/2011/main" val="1"/>
+              <ma14:wrappingTextBoxFlag xmlns:ma14="http://schemas.microsoft.com/office/mac/drawingml/2011/main" xmlns="" val="1"/>
             </a:ext>
           </a:extLst>
         </p:spPr>
@@ -4919,7 +4919,7 @@
           </a:ln>
           <a:extLst>
             <a:ext uri="{C572A759-6A51-4108-AA02-DFA0A04FC94B}">
-              <ma14:wrappingTextBoxFlag xmlns="" xmlns:ma14="http://schemas.microsoft.com/office/mac/drawingml/2011/main" val="1"/>
+              <ma14:wrappingTextBoxFlag xmlns:ma14="http://schemas.microsoft.com/office/mac/drawingml/2011/main" xmlns="" val="1"/>
             </a:ext>
           </a:extLst>
         </p:spPr>
@@ -5264,7 +5264,7 @@
           </a:ln>
           <a:extLst>
             <a:ext uri="{C572A759-6A51-4108-AA02-DFA0A04FC94B}">
-              <ma14:wrappingTextBoxFlag xmlns="" xmlns:ma14="http://schemas.microsoft.com/office/mac/drawingml/2011/main" val="1"/>
+              <ma14:wrappingTextBoxFlag xmlns:ma14="http://schemas.microsoft.com/office/mac/drawingml/2011/main" xmlns="" val="1"/>
             </a:ext>
           </a:extLst>
         </p:spPr>
@@ -5500,7 +5500,7 @@
           </a:ln>
           <a:extLst>
             <a:ext uri="{C572A759-6A51-4108-AA02-DFA0A04FC94B}">
-              <ma14:wrappingTextBoxFlag xmlns="" xmlns:ma14="http://schemas.microsoft.com/office/mac/drawingml/2011/main" val="1"/>
+              <ma14:wrappingTextBoxFlag xmlns:ma14="http://schemas.microsoft.com/office/mac/drawingml/2011/main" xmlns="" val="1"/>
             </a:ext>
           </a:extLst>
         </p:spPr>
@@ -5806,7 +5806,7 @@
           </a:ln>
           <a:extLst>
             <a:ext uri="{C572A759-6A51-4108-AA02-DFA0A04FC94B}">
-              <ma14:wrappingTextBoxFlag xmlns="" xmlns:ma14="http://schemas.microsoft.com/office/mac/drawingml/2011/main" val="1"/>
+              <ma14:wrappingTextBoxFlag xmlns:ma14="http://schemas.microsoft.com/office/mac/drawingml/2011/main" xmlns="" val="1"/>
             </a:ext>
           </a:extLst>
         </p:spPr>
@@ -6142,7 +6142,7 @@
           </a:ln>
           <a:extLst>
             <a:ext uri="{C572A759-6A51-4108-AA02-DFA0A04FC94B}">
-              <ma14:wrappingTextBoxFlag xmlns="" xmlns:ma14="http://schemas.microsoft.com/office/mac/drawingml/2011/main" val="1"/>
+              <ma14:wrappingTextBoxFlag xmlns:ma14="http://schemas.microsoft.com/office/mac/drawingml/2011/main" xmlns="" val="1"/>
             </a:ext>
           </a:extLst>
         </p:spPr>
@@ -6494,7 +6494,7 @@
           </a:ln>
           <a:extLst>
             <a:ext uri="{C572A759-6A51-4108-AA02-DFA0A04FC94B}">
-              <ma14:wrappingTextBoxFlag xmlns="" xmlns:ma14="http://schemas.microsoft.com/office/mac/drawingml/2011/main" val="1"/>
+              <ma14:wrappingTextBoxFlag xmlns:ma14="http://schemas.microsoft.com/office/mac/drawingml/2011/main" xmlns="" val="1"/>
             </a:ext>
           </a:extLst>
         </p:spPr>
@@ -6751,7 +6751,7 @@
           </a:ln>
           <a:extLst>
             <a:ext uri="{C572A759-6A51-4108-AA02-DFA0A04FC94B}">
-              <ma14:wrappingTextBoxFlag xmlns="" xmlns:ma14="http://schemas.microsoft.com/office/mac/drawingml/2011/main" val="1"/>
+              <ma14:wrappingTextBoxFlag xmlns:ma14="http://schemas.microsoft.com/office/mac/drawingml/2011/main" xmlns="" val="1"/>
             </a:ext>
           </a:extLst>
         </p:spPr>
@@ -7045,7 +7045,7 @@
           </a:ln>
           <a:extLst>
             <a:ext uri="{C572A759-6A51-4108-AA02-DFA0A04FC94B}">
-              <ma14:wrappingTextBoxFlag xmlns="" xmlns:ma14="http://schemas.microsoft.com/office/mac/drawingml/2011/main" val="1"/>
+              <ma14:wrappingTextBoxFlag xmlns:ma14="http://schemas.microsoft.com/office/mac/drawingml/2011/main" xmlns="" val="1"/>
             </a:ext>
           </a:extLst>
         </p:spPr>
@@ -7410,7 +7410,7 @@
           </a:ln>
           <a:extLst>
             <a:ext uri="{C572A759-6A51-4108-AA02-DFA0A04FC94B}">
-              <ma14:wrappingTextBoxFlag xmlns="" xmlns:ma14="http://schemas.microsoft.com/office/mac/drawingml/2011/main" val="1"/>
+              <ma14:wrappingTextBoxFlag xmlns:ma14="http://schemas.microsoft.com/office/mac/drawingml/2011/main" xmlns="" val="1"/>
             </a:ext>
           </a:extLst>
         </p:spPr>
@@ -7990,7 +7990,7 @@
           </a:ln>
           <a:extLst>
             <a:ext uri="{C572A759-6A51-4108-AA02-DFA0A04FC94B}">
-              <ma14:wrappingTextBoxFlag xmlns="" xmlns:ma14="http://schemas.microsoft.com/office/mac/drawingml/2011/main" val="1"/>
+              <ma14:wrappingTextBoxFlag xmlns:ma14="http://schemas.microsoft.com/office/mac/drawingml/2011/main" xmlns="" val="1"/>
             </a:ext>
           </a:extLst>
         </p:spPr>
@@ -8294,7 +8294,7 @@
           </a:ln>
           <a:extLst>
             <a:ext uri="{C572A759-6A51-4108-AA02-DFA0A04FC94B}">
-              <ma14:wrappingTextBoxFlag xmlns="" xmlns:ma14="http://schemas.microsoft.com/office/mac/drawingml/2011/main" val="1"/>
+              <ma14:wrappingTextBoxFlag xmlns:ma14="http://schemas.microsoft.com/office/mac/drawingml/2011/main" xmlns="" val="1"/>
             </a:ext>
           </a:extLst>
         </p:spPr>
@@ -8530,7 +8530,7 @@
           </a:ln>
           <a:extLst>
             <a:ext uri="{C572A759-6A51-4108-AA02-DFA0A04FC94B}">
-              <ma14:wrappingTextBoxFlag xmlns="" xmlns:ma14="http://schemas.microsoft.com/office/mac/drawingml/2011/main" val="1"/>
+              <ma14:wrappingTextBoxFlag xmlns:ma14="http://schemas.microsoft.com/office/mac/drawingml/2011/main" xmlns="" val="1"/>
             </a:ext>
           </a:extLst>
         </p:spPr>
@@ -8791,7 +8791,7 @@
           </a:ln>
           <a:extLst>
             <a:ext uri="{C572A759-6A51-4108-AA02-DFA0A04FC94B}">
-              <ma14:wrappingTextBoxFlag xmlns="" xmlns:ma14="http://schemas.microsoft.com/office/mac/drawingml/2011/main" val="1"/>
+              <ma14:wrappingTextBoxFlag xmlns:ma14="http://schemas.microsoft.com/office/mac/drawingml/2011/main" xmlns="" val="1"/>
             </a:ext>
           </a:extLst>
         </p:spPr>
@@ -9068,7 +9068,7 @@
           </a:ln>
           <a:extLst>
             <a:ext uri="{C572A759-6A51-4108-AA02-DFA0A04FC94B}">
-              <ma14:wrappingTextBoxFlag xmlns="" xmlns:ma14="http://schemas.microsoft.com/office/mac/drawingml/2011/main" val="1"/>
+              <ma14:wrappingTextBoxFlag xmlns:ma14="http://schemas.microsoft.com/office/mac/drawingml/2011/main" xmlns="" val="1"/>
             </a:ext>
           </a:extLst>
         </p:spPr>
@@ -9369,7 +9369,7 @@
           </a:ln>
           <a:extLst>
             <a:ext uri="{C572A759-6A51-4108-AA02-DFA0A04FC94B}">
-              <ma14:wrappingTextBoxFlag xmlns="" xmlns:ma14="http://schemas.microsoft.com/office/mac/drawingml/2011/main" val="1"/>
+              <ma14:wrappingTextBoxFlag xmlns:ma14="http://schemas.microsoft.com/office/mac/drawingml/2011/main" xmlns="" val="1"/>
             </a:ext>
           </a:extLst>
         </p:spPr>
@@ -9623,7 +9623,7 @@
           </a:ln>
           <a:extLst>
             <a:ext uri="{C572A759-6A51-4108-AA02-DFA0A04FC94B}">
-              <ma14:wrappingTextBoxFlag xmlns="" xmlns:ma14="http://schemas.microsoft.com/office/mac/drawingml/2011/main" val="1"/>
+              <ma14:wrappingTextBoxFlag xmlns:ma14="http://schemas.microsoft.com/office/mac/drawingml/2011/main" xmlns="" val="1"/>
             </a:ext>
           </a:extLst>
         </p:spPr>
@@ -9949,7 +9949,7 @@
           </a:ln>
           <a:extLst>
             <a:ext uri="{C572A759-6A51-4108-AA02-DFA0A04FC94B}">
-              <ma14:wrappingTextBoxFlag xmlns="" xmlns:ma14="http://schemas.microsoft.com/office/mac/drawingml/2011/main" val="1"/>
+              <ma14:wrappingTextBoxFlag xmlns:ma14="http://schemas.microsoft.com/office/mac/drawingml/2011/main" xmlns="" val="1"/>
             </a:ext>
           </a:extLst>
         </p:spPr>
@@ -10223,7 +10223,7 @@
           </a:ln>
           <a:extLst>
             <a:ext uri="{C572A759-6A51-4108-AA02-DFA0A04FC94B}">
-              <ma14:wrappingTextBoxFlag xmlns="" xmlns:ma14="http://schemas.microsoft.com/office/mac/drawingml/2011/main" val="1"/>
+              <ma14:wrappingTextBoxFlag xmlns:ma14="http://schemas.microsoft.com/office/mac/drawingml/2011/main" xmlns="" val="1"/>
             </a:ext>
           </a:extLst>
         </p:spPr>
@@ -10450,7 +10450,7 @@
           </a:ln>
           <a:extLst>
             <a:ext uri="{C572A759-6A51-4108-AA02-DFA0A04FC94B}">
-              <ma14:wrappingTextBoxFlag xmlns="" xmlns:ma14="http://schemas.microsoft.com/office/mac/drawingml/2011/main" val="1"/>
+              <ma14:wrappingTextBoxFlag xmlns:ma14="http://schemas.microsoft.com/office/mac/drawingml/2011/main" xmlns="" val="1"/>
             </a:ext>
           </a:extLst>
         </p:spPr>
@@ -10934,7 +10934,7 @@
           </a:ln>
           <a:extLst>
             <a:ext uri="{C572A759-6A51-4108-AA02-DFA0A04FC94B}">
-              <ma14:wrappingTextBoxFlag xmlns="" xmlns:ma14="http://schemas.microsoft.com/office/mac/drawingml/2011/main" val="1"/>
+              <ma14:wrappingTextBoxFlag xmlns:ma14="http://schemas.microsoft.com/office/mac/drawingml/2011/main" xmlns="" val="1"/>
             </a:ext>
           </a:extLst>
         </p:spPr>
@@ -11226,7 +11226,7 @@
           </a:ln>
           <a:extLst>
             <a:ext uri="{C572A759-6A51-4108-AA02-DFA0A04FC94B}">
-              <ma14:wrappingTextBoxFlag xmlns="" xmlns:ma14="http://schemas.microsoft.com/office/mac/drawingml/2011/main" val="1"/>
+              <ma14:wrappingTextBoxFlag xmlns:ma14="http://schemas.microsoft.com/office/mac/drawingml/2011/main" xmlns="" val="1"/>
             </a:ext>
           </a:extLst>
         </p:spPr>
@@ -11778,7 +11778,7 @@
           </a:ln>
           <a:extLst>
             <a:ext uri="{C572A759-6A51-4108-AA02-DFA0A04FC94B}">
-              <ma14:wrappingTextBoxFlag xmlns="" xmlns:ma14="http://schemas.microsoft.com/office/mac/drawingml/2011/main" val="1"/>
+              <ma14:wrappingTextBoxFlag xmlns:ma14="http://schemas.microsoft.com/office/mac/drawingml/2011/main" xmlns="" val="1"/>
             </a:ext>
           </a:extLst>
         </p:spPr>
@@ -12218,7 +12218,7 @@
           </a:ln>
           <a:extLst>
             <a:ext uri="{C572A759-6A51-4108-AA02-DFA0A04FC94B}">
-              <ma14:wrappingTextBoxFlag xmlns="" xmlns:ma14="http://schemas.microsoft.com/office/mac/drawingml/2011/main" val="1"/>
+              <ma14:wrappingTextBoxFlag xmlns:ma14="http://schemas.microsoft.com/office/mac/drawingml/2011/main" xmlns="" val="1"/>
             </a:ext>
           </a:extLst>
         </p:spPr>
@@ -12391,7 +12391,7 @@
           </a:ln>
           <a:extLst>
             <a:ext uri="{C572A759-6A51-4108-AA02-DFA0A04FC94B}">
-              <ma14:wrappingTextBoxFlag xmlns="" xmlns:ma14="http://schemas.microsoft.com/office/mac/drawingml/2011/main" val="1"/>
+              <ma14:wrappingTextBoxFlag xmlns:ma14="http://schemas.microsoft.com/office/mac/drawingml/2011/main" xmlns="" val="1"/>
             </a:ext>
           </a:extLst>
         </p:spPr>
@@ -12495,7 +12495,7 @@
               </a:defRPr>
             </a:pPr>
             <a:r>
-              <a:rPr sz="3200">
+              <a:rPr sz="3200" dirty="0">
                 <a:uFill>
                   <a:solidFill/>
                 </a:uFill>
@@ -12516,7 +12516,7 @@
               </a:defRPr>
             </a:pPr>
             <a:r>
-              <a:rPr sz="3200">
+              <a:rPr sz="3200" dirty="0">
                 <a:uFill>
                   <a:solidFill/>
                 </a:uFill>
@@ -12537,7 +12537,7 @@
               </a:defRPr>
             </a:pPr>
             <a:r>
-              <a:rPr sz="3200">
+              <a:rPr sz="3200" dirty="0">
                 <a:uFill>
                   <a:solidFill/>
                 </a:uFill>
@@ -12558,12 +12558,44 @@
               </a:defRPr>
             </a:pPr>
             <a:r>
+              <a:rPr sz="3200" dirty="0">
+                <a:uFill>
+                  <a:solidFill/>
+                </a:uFill>
+              </a:rPr>
+              <a:t>String methods allow you to do special actions on strings (find, replace, count</a:t>
+            </a:r>
+            <a:r>
               <a:rPr sz="3200">
                 <a:uFill>
                   <a:solidFill/>
                 </a:uFill>
               </a:rPr>
-              <a:t>String methods allow you to do special actions on strings (find, replace, count, lowercase, etc)</a:t>
+              <a:t>, </a:t>
+            </a:r>
+            <a:r>
+              <a:rPr sz="3200" smtClean="0">
+                <a:uFill>
+                  <a:solidFill/>
+                </a:uFill>
+              </a:rPr>
+              <a:t>lower, </a:t>
+            </a:r>
+            <a:r>
+              <a:rPr sz="3200" dirty="0" err="1">
+                <a:uFill>
+                  <a:solidFill/>
+                </a:uFill>
+              </a:rPr>
+              <a:t>etc</a:t>
+            </a:r>
+            <a:r>
+              <a:rPr sz="3200" dirty="0">
+                <a:uFill>
+                  <a:solidFill/>
+                </a:uFill>
+              </a:rPr>
+              <a:t>)</a:t>
             </a:r>
           </a:p>
         </p:txBody>
@@ -12592,7 +12624,7 @@
           </a:ln>
           <a:extLst>
             <a:ext uri="{C572A759-6A51-4108-AA02-DFA0A04FC94B}">
-              <ma14:wrappingTextBoxFlag xmlns="" xmlns:ma14="http://schemas.microsoft.com/office/mac/drawingml/2011/main" val="1"/>
+              <ma14:wrappingTextBoxFlag xmlns:ma14="http://schemas.microsoft.com/office/mac/drawingml/2011/main" xmlns="" val="1"/>
             </a:ext>
           </a:extLst>
         </p:spPr>
@@ -12855,7 +12887,7 @@
           </a:ln>
           <a:extLst>
             <a:ext uri="{C572A759-6A51-4108-AA02-DFA0A04FC94B}">
-              <ma14:wrappingTextBoxFlag xmlns="" xmlns:ma14="http://schemas.microsoft.com/office/mac/drawingml/2011/main" val="1"/>
+              <ma14:wrappingTextBoxFlag xmlns:ma14="http://schemas.microsoft.com/office/mac/drawingml/2011/main" xmlns="" val="1"/>
             </a:ext>
           </a:extLst>
         </p:spPr>
@@ -13052,7 +13084,7 @@
           </a:ln>
           <a:extLst>
             <a:ext uri="{C572A759-6A51-4108-AA02-DFA0A04FC94B}">
-              <ma14:wrappingTextBoxFlag xmlns="" xmlns:ma14="http://schemas.microsoft.com/office/mac/drawingml/2011/main" val="1"/>
+              <ma14:wrappingTextBoxFlag xmlns:ma14="http://schemas.microsoft.com/office/mac/drawingml/2011/main" xmlns="" val="1"/>
             </a:ext>
           </a:extLst>
         </p:spPr>
@@ -13271,7 +13303,7 @@
           </a:ln>
           <a:extLst>
             <a:ext uri="{C572A759-6A51-4108-AA02-DFA0A04FC94B}">
-              <ma14:wrappingTextBoxFlag xmlns="" xmlns:ma14="http://schemas.microsoft.com/office/mac/drawingml/2011/main" val="1"/>
+              <ma14:wrappingTextBoxFlag xmlns:ma14="http://schemas.microsoft.com/office/mac/drawingml/2011/main" xmlns="" val="1"/>
             </a:ext>
           </a:extLst>
         </p:spPr>
@@ -13578,7 +13610,7 @@
           </a:ln>
           <a:extLst>
             <a:ext uri="{C572A759-6A51-4108-AA02-DFA0A04FC94B}">
-              <ma14:wrappingTextBoxFlag xmlns="" xmlns:ma14="http://schemas.microsoft.com/office/mac/drawingml/2011/main" val="1"/>
+              <ma14:wrappingTextBoxFlag xmlns:ma14="http://schemas.microsoft.com/office/mac/drawingml/2011/main" xmlns="" val="1"/>
             </a:ext>
           </a:extLst>
         </p:spPr>

</xml_diff>